<commit_message>
added intro slide for security discussion
</commit_message>
<xml_diff>
--- a/Modul3/FY16Q2 Azure Kosten & Sicherheit (Hybrid IT 2015).pptx
+++ b/Modul3/FY16Q2 Azure Kosten & Sicherheit (Hybrid IT 2015).pptx
@@ -5,10 +5,10 @@
     <p:sldMasterId id="2147483746" r:id="rId6"/>
   </p:sldMasterIdLst>
   <p:notesMasterIdLst>
-    <p:notesMasterId r:id="rId16"/>
+    <p:notesMasterId r:id="rId17"/>
   </p:notesMasterIdLst>
   <p:handoutMasterIdLst>
-    <p:handoutMasterId r:id="rId17"/>
+    <p:handoutMasterId r:id="rId18"/>
   </p:handoutMasterIdLst>
   <p:sldIdLst>
     <p:sldId id="409" r:id="rId7"/>
@@ -19,7 +19,8 @@
     <p:sldId id="540" r:id="rId12"/>
     <p:sldId id="541" r:id="rId13"/>
     <p:sldId id="542" r:id="rId14"/>
-    <p:sldId id="527" r:id="rId15"/>
+    <p:sldId id="543" r:id="rId15"/>
+    <p:sldId id="527" r:id="rId16"/>
   </p:sldIdLst>
   <p:sldSz cx="12436475" cy="6994525"/>
   <p:notesSz cx="6858000" cy="9144000"/>
@@ -135,6 +136,7 @@
             <p14:sldId id="540"/>
             <p14:sldId id="541"/>
             <p14:sldId id="542"/>
+            <p14:sldId id="543"/>
           </p14:sldIdLst>
         </p14:section>
         <p14:section name="Outro" id="{E8BBA2FB-63B4-4B05-9595-8BFF66D9584D}">
@@ -271,7 +273,7 @@
           <a:p>
             <a:fld id="{53E720BF-5BAB-4715-8B3B-2856BF90270A}" type="datetimeFigureOut">
               <a:rPr lang="de-DE" smtClean="0"/>
-              <a:t>20.10.2015</a:t>
+              <a:t>10.11.2015</a:t>
             </a:fld>
             <a:endParaRPr lang="de-DE"/>
           </a:p>
@@ -436,7 +438,7 @@
           <a:p>
             <a:fld id="{9D9CDDDB-B493-4813-BA5B-F25DD0BAB6F6}" type="datetimeFigureOut">
               <a:rPr lang="en-US" smtClean="0"/>
-              <a:t>10/20/2015</a:t>
+              <a:t>11/10/2015</a:t>
             </a:fld>
             <a:endParaRPr lang="en-US"/>
           </a:p>
@@ -995,7 +997,7 @@
                 <a:latin typeface="Calibri" charset="0"/>
               </a:rPr>
               <a:pPr eaLnBrk="1" hangingPunct="1"/>
-              <a:t>10/20/2015</a:t>
+              <a:t>11/10/2015</a:t>
             </a:fld>
             <a:endParaRPr lang="en-US" sz="1200">
               <a:solidFill>
@@ -1343,15 +1345,7 @@
           <a:p>
             <a:r>
               <a:rPr lang="de-DE" dirty="0" smtClean="0"/>
-              <a:t>http</a:t>
-            </a:r>
-            <a:r>
-              <a:rPr lang="de-DE" dirty="0" smtClean="0"/>
-              <a:t>://</a:t>
-            </a:r>
-            <a:r>
-              <a:rPr lang="de-DE" dirty="0" smtClean="0"/>
-              <a:t>azure.microsoft.com/de-de/offers/ms-azr-0063p</a:t>
+              <a:t>http://azure.microsoft.com/de-de/offers/ms-azr-0063p</a:t>
             </a:r>
           </a:p>
           <a:p>
@@ -1496,11 +1490,7 @@
             </a:r>
             <a:r>
               <a:rPr lang="de-DE" baseline="0" dirty="0" smtClean="0"/>
-              <a:t> </a:t>
-            </a:r>
-            <a:r>
-              <a:rPr lang="de-DE" baseline="0" dirty="0" smtClean="0"/>
-              <a:t>= Pay-</a:t>
+              <a:t> = Pay-</a:t>
             </a:r>
             <a:r>
               <a:rPr lang="de-DE" baseline="0" dirty="0" err="1" smtClean="0"/>
@@ -1516,11 +1506,7 @@
             </a:r>
             <a:r>
               <a:rPr lang="de-DE" baseline="0" dirty="0" smtClean="0"/>
-              <a:t>, </a:t>
-            </a:r>
-            <a:r>
-              <a:rPr lang="de-DE" baseline="0" dirty="0" smtClean="0"/>
-              <a:t>Verbrauchstarif</a:t>
+              <a:t>, Verbrauchstarif</a:t>
             </a:r>
           </a:p>
           <a:p>
@@ -1855,11 +1841,7 @@
             </a:r>
             <a:r>
               <a:rPr lang="de-DE" baseline="0" dirty="0" smtClean="0"/>
-              <a:t> </a:t>
-            </a:r>
-            <a:r>
-              <a:rPr lang="de-DE" baseline="0" dirty="0" smtClean="0"/>
-              <a:t>= Pay-</a:t>
+              <a:t> = Pay-</a:t>
             </a:r>
             <a:r>
               <a:rPr lang="de-DE" baseline="0" dirty="0" err="1" smtClean="0"/>
@@ -2058,7 +2040,7 @@
                   <a:prstClr val="black"/>
                 </a:solidFill>
               </a:rPr>
-              <a:t>10/20/2015 2:58 PM</a:t>
+              <a:t>11/10/2015 11:30 PM</a:t>
             </a:fld>
             <a:endParaRPr lang="en-US" dirty="0">
               <a:solidFill>
@@ -2090,7 +2072,7 @@
                 </a:solidFill>
               </a:rPr>
               <a:pPr/>
-              <a:t>9</a:t>
+              <a:t>10</a:t>
             </a:fld>
             <a:endParaRPr lang="en-US" dirty="0">
               <a:solidFill>
@@ -5331,6 +5313,55 @@
   <p:transition>
     <p:fade/>
   </p:transition>
+  <p:timing>
+    <p:tnLst>
+      <p:par>
+        <p:cTn id="1" dur="indefinite" restart="never" nodeType="tmRoot"/>
+      </p:par>
+    </p:tnLst>
+  </p:timing>
+</p:sld>
+</file>
+
+<file path=ppt/slides/slide10.xml><?xml version="1.0" encoding="utf-8"?>
+<p:sld xmlns:a="http://schemas.openxmlformats.org/drawingml/2006/main" xmlns:r="http://schemas.openxmlformats.org/officeDocument/2006/relationships" xmlns:p="http://schemas.openxmlformats.org/presentationml/2006/main">
+  <p:cSld>
+    <p:spTree>
+      <p:nvGrpSpPr>
+        <p:cNvPr id="1" name=""/>
+        <p:cNvGrpSpPr/>
+        <p:nvPr/>
+      </p:nvGrpSpPr>
+      <p:grpSpPr>
+        <a:xfrm>
+          <a:off x="0" y="0"/>
+          <a:ext cx="0" cy="0"/>
+          <a:chOff x="0" y="0"/>
+          <a:chExt cx="0" cy="0"/>
+        </a:xfrm>
+      </p:grpSpPr>
+    </p:spTree>
+    <p:extLst>
+      <p:ext uri="{BB962C8B-B14F-4D97-AF65-F5344CB8AC3E}">
+        <p14:creationId xmlns:p14="http://schemas.microsoft.com/office/powerpoint/2010/main" val="1169096581"/>
+      </p:ext>
+    </p:extLst>
+  </p:cSld>
+  <p:clrMapOvr>
+    <a:masterClrMapping/>
+  </p:clrMapOvr>
+  <mc:AlternateContent xmlns:mc="http://schemas.openxmlformats.org/markup-compatibility/2006" xmlns:p14="http://schemas.microsoft.com/office/powerpoint/2010/main">
+    <mc:Choice Requires="p14">
+      <p:transition spd="med" p14:dur="700">
+        <p:fade/>
+      </p:transition>
+    </mc:Choice>
+    <mc:Fallback xmlns="">
+      <p:transition spd="med">
+        <p:fade/>
+      </p:transition>
+    </mc:Fallback>
+  </mc:AlternateContent>
   <p:timing>
     <p:tnLst>
       <p:par>
@@ -18093,7 +18124,6 @@
               <a:rPr lang="de-DE" dirty="0" smtClean="0"/>
               <a:t>Hochfrequentierte Webseite</a:t>
             </a:r>
-            <a:endParaRPr lang="de-DE" dirty="0" smtClean="0"/>
           </a:p>
           <a:p>
             <a:pPr lvl="1"/>
@@ -19138,11 +19168,7 @@
           <a:p>
             <a:r>
               <a:rPr lang="de-DE" sz="4080" dirty="0" smtClean="0"/>
-              <a:t>Hochfrequentierte </a:t>
-            </a:r>
-            <a:r>
-              <a:rPr lang="de-DE" sz="4080" dirty="0" smtClean="0"/>
-              <a:t>Webseite (PAYG) </a:t>
+              <a:t>Hochfrequentierte Webseite (PAYG) </a:t>
             </a:r>
             <a:r>
               <a:rPr lang="de-DE" sz="2040" dirty="0"/>
@@ -19150,11 +19176,7 @@
             </a:r>
             <a:r>
               <a:rPr lang="de-DE" sz="2040" dirty="0" smtClean="0"/>
-              <a:t>2</a:t>
-            </a:r>
-            <a:r>
-              <a:rPr lang="de-DE" sz="2040" dirty="0" smtClean="0"/>
-              <a:t>0.10.2015)</a:t>
+              <a:t>20.10.2015)</a:t>
             </a:r>
             <a:endParaRPr lang="de-DE" sz="4080" dirty="0"/>
           </a:p>
@@ -19269,11 +19291,7 @@
                       </a:r>
                       <a:r>
                         <a:rPr lang="de-DE" sz="1600" baseline="0" dirty="0" smtClean="0"/>
-                        <a:t> / </a:t>
-                      </a:r>
-                      <a:r>
-                        <a:rPr lang="de-DE" sz="1600" baseline="0" dirty="0" smtClean="0"/>
-                        <a:t>Tag</a:t>
+                        <a:t> / Tag</a:t>
                       </a:r>
                       <a:endParaRPr lang="de-DE" sz="1600" dirty="0"/>
                     </a:p>
@@ -19324,11 +19342,7 @@
                       </a:r>
                       <a:r>
                         <a:rPr lang="de-DE" sz="1600" baseline="0" dirty="0" smtClean="0"/>
-                        <a:t> </a:t>
-                      </a:r>
-                      <a:r>
-                        <a:rPr lang="de-DE" sz="1600" baseline="0" dirty="0" smtClean="0"/>
-                        <a:t>S2</a:t>
+                        <a:t> S2</a:t>
                       </a:r>
                     </a:p>
                     <a:p>
@@ -19411,11 +19425,7 @@
                       </a:r>
                       <a:r>
                         <a:rPr lang="de-DE" sz="1600" baseline="0" dirty="0" smtClean="0"/>
-                        <a:t> </a:t>
-                      </a:r>
-                      <a:r>
-                        <a:rPr lang="de-DE" sz="1600" baseline="0" dirty="0" smtClean="0"/>
-                        <a:t>S2</a:t>
+                        <a:t> S2</a:t>
                       </a:r>
                     </a:p>
                     <a:p>
@@ -19560,7 +19570,6 @@
                         <a:rPr lang="de-DE" sz="1600" dirty="0" smtClean="0"/>
                         <a:t>)</a:t>
                       </a:r>
-                      <a:endParaRPr lang="de-DE" sz="1600" dirty="0" smtClean="0"/>
                     </a:p>
                     <a:p>
                       <a:r>
@@ -19579,11 +19588,7 @@
                     <a:p>
                       <a:r>
                         <a:rPr lang="de-DE" sz="1600" dirty="0" smtClean="0"/>
-                        <a:t>€0,0203  </a:t>
-                      </a:r>
-                      <a:r>
-                        <a:rPr lang="de-DE" sz="1600" dirty="0" smtClean="0"/>
-                        <a:t>/</a:t>
+                        <a:t>€0,0203  /</a:t>
                       </a:r>
                       <a:r>
                         <a:rPr lang="de-DE" sz="1600" baseline="0" dirty="0" smtClean="0"/>
@@ -19615,17 +19620,8 @@
                     <a:p>
                       <a:r>
                         <a:rPr lang="de-DE" sz="1600" dirty="0" smtClean="0"/>
-                        <a:t>(€20,7872 </a:t>
+                        <a:t>(€20,7872 / Monat)</a:t>
                       </a:r>
-                      <a:r>
-                        <a:rPr lang="de-DE" sz="1600" dirty="0" smtClean="0"/>
-                        <a:t>/ </a:t>
-                      </a:r>
-                      <a:r>
-                        <a:rPr lang="de-DE" sz="1600" dirty="0" smtClean="0"/>
-                        <a:t>Monat)</a:t>
-                      </a:r>
-                      <a:endParaRPr lang="de-DE" sz="1600" dirty="0" smtClean="0"/>
                     </a:p>
                   </a:txBody>
                   <a:tcPr marL="93260" marR="93260" marT="46630" marB="46630"/>
@@ -19666,11 +19662,7 @@
                       </a:r>
                       <a:r>
                         <a:rPr lang="de-DE" sz="1600" dirty="0" smtClean="0"/>
-                        <a:t>1.000.000 </a:t>
-                      </a:r>
-                      <a:r>
-                        <a:rPr lang="de-DE" sz="1600" dirty="0" smtClean="0"/>
-                        <a:t>Transaktionen</a:t>
+                        <a:t>1.000.000 Transaktionen</a:t>
                       </a:r>
                       <a:endParaRPr lang="de-DE" sz="1600" dirty="0"/>
                     </a:p>
@@ -19700,7 +19692,6 @@
                         <a:rPr lang="de-DE" sz="1600" dirty="0" smtClean="0"/>
                         <a:t>€0,04</a:t>
                       </a:r>
-                      <a:endParaRPr lang="de-DE" sz="1600" dirty="0" smtClean="0"/>
                     </a:p>
                   </a:txBody>
                   <a:tcPr marL="93260" marR="93260" marT="46630" marB="46630"/>
@@ -19733,11 +19724,7 @@
                     <a:p>
                       <a:r>
                         <a:rPr lang="de-DE" sz="1600" dirty="0" smtClean="0"/>
-                        <a:t>1 </a:t>
-                      </a:r>
-                      <a:r>
-                        <a:rPr lang="de-DE" sz="1600" dirty="0" smtClean="0"/>
-                        <a:t>TB</a:t>
+                        <a:t>1 TB</a:t>
                       </a:r>
                       <a:endParaRPr lang="de-DE" sz="1600" dirty="0"/>
                     </a:p>
@@ -19777,7 +19764,6 @@
                         <a:rPr lang="de-DE" sz="1600" dirty="0" smtClean="0"/>
                         <a:t>€75,1616</a:t>
                       </a:r>
-                      <a:endParaRPr lang="de-DE" sz="1600" dirty="0" smtClean="0"/>
                     </a:p>
                   </a:txBody>
                   <a:tcPr marL="93260" marR="93260" marT="46630" marB="46630"/>
@@ -19932,15 +19918,7 @@
             </a:r>
             <a:r>
               <a:rPr lang="de-DE" sz="2040" dirty="0" smtClean="0"/>
-              <a:t>20</a:t>
-            </a:r>
-            <a:r>
-              <a:rPr lang="de-DE" sz="2040" dirty="0" smtClean="0"/>
-              <a:t>.10.2015</a:t>
-            </a:r>
-            <a:r>
-              <a:rPr lang="de-DE" sz="2040" dirty="0" smtClean="0"/>
-              <a:t>)</a:t>
+              <a:t>20.10.2015)</a:t>
             </a:r>
             <a:endParaRPr lang="de-DE" sz="4080" dirty="0"/>
           </a:p>
@@ -20055,11 +20033,7 @@
                       </a:r>
                       <a:r>
                         <a:rPr lang="de-DE" sz="1600" baseline="0" dirty="0" smtClean="0"/>
-                        <a:t> / </a:t>
-                      </a:r>
-                      <a:r>
-                        <a:rPr lang="de-DE" sz="1600" baseline="0" dirty="0" smtClean="0"/>
-                        <a:t>Monat</a:t>
+                        <a:t> / Monat</a:t>
                       </a:r>
                       <a:endParaRPr lang="de-DE" sz="1600" dirty="0"/>
                     </a:p>
@@ -20100,7 +20074,6 @@
                         <a:rPr lang="de-DE" sz="1600" dirty="0" smtClean="0"/>
                         <a:t>45x 20 GB</a:t>
                       </a:r>
-                      <a:endParaRPr lang="de-DE" sz="1600" dirty="0" smtClean="0"/>
                     </a:p>
                   </a:txBody>
                   <a:tcPr marL="93260" marR="93260" marT="46630" marB="46630"/>
@@ -20120,7 +20093,6 @@
                         <a:rPr lang="de-DE" sz="1600" dirty="0" smtClean="0"/>
                         <a:t>€4,2165 / Monat</a:t>
                       </a:r>
-                      <a:endParaRPr lang="de-DE" sz="1600" dirty="0" smtClean="0"/>
                     </a:p>
                   </a:txBody>
                   <a:tcPr marL="93260" marR="93260" marT="46630" marB="46630"/>
@@ -20181,7 +20153,6 @@
                         <a:rPr lang="de-DE" sz="1600" dirty="0" smtClean="0"/>
                         <a:t>€0,0203 / GB (Preisstufe bis 1 TB)</a:t>
                       </a:r>
-                      <a:endParaRPr lang="de-DE" sz="1600" dirty="0" smtClean="0"/>
                     </a:p>
                   </a:txBody>
                   <a:tcPr marL="93260" marR="93260" marT="46630" marB="46630"/>
@@ -20275,7 +20246,6 @@
                         <a:rPr lang="de-DE" sz="1600" dirty="0" smtClean="0"/>
                         <a:t>€8,433 / Monat</a:t>
                       </a:r>
-                      <a:endParaRPr lang="de-DE" sz="1600" dirty="0" smtClean="0"/>
                     </a:p>
                   </a:txBody>
                   <a:tcPr marL="93260" marR="93260" marT="46630" marB="46630"/>
@@ -20389,7 +20359,6 @@
                         <a:rPr lang="de-DE" sz="1600" dirty="0" smtClean="0"/>
                         <a:t>= €30,3072</a:t>
                       </a:r>
-                      <a:endParaRPr lang="de-DE" sz="1600" dirty="0" smtClean="0"/>
                     </a:p>
                   </a:txBody>
                   <a:tcPr marL="93260" marR="93260" marT="46630" marB="46630"/>
@@ -20479,7 +20448,6 @@
                         <a:rPr lang="de-DE" sz="1600" dirty="0" smtClean="0"/>
                         <a:t>€33,732</a:t>
                       </a:r>
-                      <a:endParaRPr lang="de-DE" sz="1600" dirty="0" smtClean="0"/>
                     </a:p>
                   </a:txBody>
                   <a:tcPr marL="93260" marR="93260" marT="46630" marB="46630"/>
@@ -20575,7 +20543,6 @@
                         <a:rPr lang="de-DE" sz="1600" dirty="0" smtClean="0"/>
                         <a:t>= 82,7152</a:t>
                       </a:r>
-                      <a:endParaRPr lang="de-DE" sz="1600" dirty="0" smtClean="0"/>
                     </a:p>
                   </a:txBody>
                   <a:tcPr marL="93260" marR="93260" marT="46630" marB="46630"/>
@@ -20759,35 +20726,102 @@
           <a:chExt cx="0" cy="0"/>
         </a:xfrm>
       </p:grpSpPr>
+      <p:sp>
+        <p:nvSpPr>
+          <p:cNvPr id="3" name="Titel 2"/>
+          <p:cNvSpPr>
+            <a:spLocks noGrp="1"/>
+          </p:cNvSpPr>
+          <p:nvPr>
+            <p:ph type="title"/>
+          </p:nvPr>
+        </p:nvSpPr>
+        <p:spPr/>
+        <p:txBody>
+          <a:bodyPr/>
+          <a:lstStyle/>
+          <a:p>
+            <a:r>
+              <a:rPr lang="de-DE" dirty="0" smtClean="0"/>
+              <a:t>Fragen zur Sicherheit</a:t>
+            </a:r>
+            <a:endParaRPr lang="de-DE" dirty="0"/>
+          </a:p>
+        </p:txBody>
+      </p:sp>
+      <p:sp>
+        <p:nvSpPr>
+          <p:cNvPr id="4" name="Inhaltsplatzhalter 3"/>
+          <p:cNvSpPr>
+            <a:spLocks noGrp="1"/>
+          </p:cNvSpPr>
+          <p:nvPr>
+            <p:ph sz="quarter" idx="12"/>
+          </p:nvPr>
+        </p:nvSpPr>
+        <p:spPr/>
+        <p:txBody>
+          <a:bodyPr/>
+          <a:lstStyle/>
+          <a:p>
+            <a:pPr marL="0" indent="0">
+              <a:buNone/>
+            </a:pPr>
+            <a:r>
+              <a:rPr lang="de-DE" dirty="0" smtClean="0"/>
+              <a:t>Fokus:</a:t>
+            </a:r>
+          </a:p>
+          <a:p>
+            <a:r>
+              <a:rPr lang="de-DE" dirty="0" smtClean="0"/>
+              <a:t>Datensicherheit</a:t>
+            </a:r>
+          </a:p>
+          <a:p>
+            <a:pPr marL="0" indent="0">
+              <a:buNone/>
+            </a:pPr>
+            <a:endParaRPr lang="de-DE" smtClean="0"/>
+          </a:p>
+          <a:p>
+            <a:pPr marL="0" indent="0">
+              <a:buNone/>
+            </a:pPr>
+            <a:r>
+              <a:rPr lang="de-DE" smtClean="0"/>
+              <a:t>Angerissen:</a:t>
+            </a:r>
+            <a:endParaRPr lang="de-DE" dirty="0" smtClean="0"/>
+          </a:p>
+          <a:p>
+            <a:r>
+              <a:rPr lang="de-DE" dirty="0" smtClean="0"/>
+              <a:t>Datenschutz</a:t>
+            </a:r>
+          </a:p>
+          <a:p>
+            <a:r>
+              <a:rPr lang="de-DE" dirty="0" smtClean="0"/>
+              <a:t>Compliance</a:t>
+            </a:r>
+            <a:endParaRPr lang="de-DE" dirty="0" smtClean="0"/>
+          </a:p>
+        </p:txBody>
+      </p:sp>
     </p:spTree>
     <p:extLst>
       <p:ext uri="{BB962C8B-B14F-4D97-AF65-F5344CB8AC3E}">
-        <p14:creationId xmlns:p14="http://schemas.microsoft.com/office/powerpoint/2010/main" val="1169096581"/>
+        <p14:creationId xmlns:p14="http://schemas.microsoft.com/office/powerpoint/2010/main" val="4287233432"/>
       </p:ext>
     </p:extLst>
   </p:cSld>
   <p:clrMapOvr>
     <a:masterClrMapping/>
   </p:clrMapOvr>
-  <mc:AlternateContent xmlns:mc="http://schemas.openxmlformats.org/markup-compatibility/2006" xmlns:p14="http://schemas.microsoft.com/office/powerpoint/2010/main">
-    <mc:Choice Requires="p14">
-      <p:transition spd="med" p14:dur="700">
-        <p:fade/>
-      </p:transition>
-    </mc:Choice>
-    <mc:Fallback xmlns="">
-      <p:transition spd="med">
-        <p:fade/>
-      </p:transition>
-    </mc:Fallback>
-  </mc:AlternateContent>
-  <p:timing>
-    <p:tnLst>
-      <p:par>
-        <p:cTn id="1" dur="indefinite" restart="never" nodeType="tmRoot"/>
-      </p:par>
-    </p:tnLst>
-  </p:timing>
+  <p:transition>
+    <p:fade/>
+  </p:transition>
 </p:sld>
 </file>
 
@@ -21605,10 +21639,66 @@
 
 <file path=customXml/item1.xml><?xml version="1.0" encoding="utf-8"?>
 <?mso-contentType ?>
+<spe:Receivers xmlns:spe="http://schemas.microsoft.com/sharepoint/events">
+  <Receiver>
+    <Name>Document ID Generator</Name>
+    <Synchronization>Synchronous</Synchronization>
+    <Type>10001</Type>
+    <SequenceNumber>1000</SequenceNumber>
+    <Assembly>Microsoft.Office.DocumentManagement, Version=14.0.0.0, Culture=neutral, PublicKeyToken=71e9bce111e9429c</Assembly>
+    <Class>Microsoft.Office.DocumentManagement.Internal.DocIdHandler</Class>
+    <Data/>
+    <Filter/>
+  </Receiver>
+  <Receiver>
+    <Name>Document ID Generator</Name>
+    <Synchronization>Synchronous</Synchronization>
+    <Type>10002</Type>
+    <SequenceNumber>1001</SequenceNumber>
+    <Assembly>Microsoft.Office.DocumentManagement, Version=14.0.0.0, Culture=neutral, PublicKeyToken=71e9bce111e9429c</Assembly>
+    <Class>Microsoft.Office.DocumentManagement.Internal.DocIdHandler</Class>
+    <Data/>
+    <Filter/>
+  </Receiver>
+  <Receiver>
+    <Name>Document ID Generator</Name>
+    <Synchronization>Synchronous</Synchronization>
+    <Type>10004</Type>
+    <SequenceNumber>1002</SequenceNumber>
+    <Assembly>Microsoft.Office.DocumentManagement, Version=14.0.0.0, Culture=neutral, PublicKeyToken=71e9bce111e9429c</Assembly>
+    <Class>Microsoft.Office.DocumentManagement.Internal.DocIdHandler</Class>
+    <Data/>
+    <Filter/>
+  </Receiver>
+  <Receiver>
+    <Name>Document ID Generator</Name>
+    <Synchronization>Synchronous</Synchronization>
+    <Type>10006</Type>
+    <SequenceNumber>1003</SequenceNumber>
+    <Assembly>Microsoft.Office.DocumentManagement, Version=14.0.0.0, Culture=neutral, PublicKeyToken=71e9bce111e9429c</Assembly>
+    <Class>Microsoft.Office.DocumentManagement.Internal.DocIdHandler</Class>
+    <Data/>
+    <Filter/>
+  </Receiver>
+  <Receiver>
+    <Name>Document ID Generator</Name>
+    <Synchronization>Synchronous</Synchronization>
+    <Type>10009</Type>
+    <SequenceNumber>1004</SequenceNumber>
+    <Assembly>Microsoft.Office.DocumentManagement, Version=14.0.0.0, Culture=neutral, PublicKeyToken=71e9bce111e9429c</Assembly>
+    <Class>Microsoft.Office.DocumentManagement.Internal.DocIdHandler</Class>
+    <Data/>
+    <Filter/>
+  </Receiver>
+</spe:Receivers>
+</file>
+
+<file path=customXml/item2.xml><?xml version="1.0" encoding="utf-8"?>
+<?mso-contentType ?>
 <SharedContentType xmlns="Microsoft.SharePoint.Taxonomy.ContentTypeSync" SourceId="e385fb40-52d4-4fae-9c5b-3e8ff8a5878e" ContentTypeId="0x010100FF1FAB0DEDE9AF4ABA57B67AF4A9F321" PreviousValue="false"/>
 </file>
 
-<file path=customXml/item2.xml><?xml version="1.0" encoding="utf-8"?>
+<file path=customXml/item3.xml><?xml version="1.0" encoding="utf-8"?>
 <ct:contentTypeSchema xmlns:ct="http://schemas.microsoft.com/office/2006/metadata/contentType" xmlns:ma="http://schemas.microsoft.com/office/2006/metadata/properties/metaAttributes" ct:_="" ma:_="" ma:contentTypeName="KCDoc" ma:contentTypeID="0x010100FF1FAB0DEDE9AF4ABA57B67AF4A9F3210200596A0E07C3E77448942F9A5D1E81E582" ma:contentTypeVersion="77" ma:contentTypeDescription="" ma:contentTypeScope="" ma:versionID="97f91f319da502963c66db7bd9bafa24">
   <xsd:schema xmlns:xsd="http://www.w3.org/2001/XMLSchema" xmlns:xs="http://www.w3.org/2001/XMLSchema" xmlns:p="http://schemas.microsoft.com/office/2006/metadata/properties" xmlns:ns1="http://schemas.microsoft.com/sharepoint/v3" xmlns:ns2="4e240d41-6d38-4eac-9584-b3f543b50010" xmlns:ns3="230e9df3-be65-4c73-a93b-d1236ebd677e" xmlns:ns4="7b813d5f-7206-4d46-95a5-a58185f478af" xmlns:ns5="http://schemas.microsoft.com/sharepoint/v4" targetNamespace="http://schemas.microsoft.com/office/2006/metadata/properties" ma:root="true" ma:fieldsID="36d8d8ec0295720aab47118a50085ece" ns1:_="" ns2:_="" ns3:_="" ns4:_="" ns5:_="">
     <xsd:import namespace="http://schemas.microsoft.com/sharepoint/v3"/>
@@ -22103,7 +22193,7 @@
 </ct:contentTypeSchema>
 </file>
 
-<file path=customXml/item3.xml><?xml version="1.0" encoding="utf-8"?>
+<file path=customXml/item4.xml><?xml version="1.0" encoding="utf-8"?>
 <p:properties xmlns:p="http://schemas.microsoft.com/office/2006/metadata/properties" xmlns:xsi="http://www.w3.org/2001/XMLSchema-instance" xmlns:pc="http://schemas.microsoft.com/office/infopath/2007/PartnerControls">
   <documentManagement>
     <DocumentDescription xmlns="4e240d41-6d38-4eac-9584-b3f543b50010">Use this deck as the main EBC and Azure Overview deck.  Customize the deck as needed (additional slides in the appendix).  This deck should be delivered with the supporting demo’s and is scoped at the decision makers within IT.</DocumentDescription>
@@ -22377,7 +22467,7 @@
 </p:properties>
 </file>
 
-<file path=customXml/item4.xml><?xml version="1.0" encoding="utf-8"?>
+<file path=customXml/item5.xml><?xml version="1.0" encoding="utf-8"?>
 <?mso-contentType ?>
 <FormTemplates xmlns="http://schemas.microsoft.com/sharepoint/v3/contenttype/forms">
   <Display>DocumentLibraryForm</Display>
@@ -22386,63 +22476,15 @@
 </FormTemplates>
 </file>
 
-<file path=customXml/item5.xml><?xml version="1.0" encoding="utf-8"?>
-<?mso-contentType ?>
-<spe:Receivers xmlns:spe="http://schemas.microsoft.com/sharepoint/events">
-  <Receiver>
-    <Name>Document ID Generator</Name>
-    <Synchronization>Synchronous</Synchronization>
-    <Type>10001</Type>
-    <SequenceNumber>1000</SequenceNumber>
-    <Assembly>Microsoft.Office.DocumentManagement, Version=14.0.0.0, Culture=neutral, PublicKeyToken=71e9bce111e9429c</Assembly>
-    <Class>Microsoft.Office.DocumentManagement.Internal.DocIdHandler</Class>
-    <Data/>
-    <Filter/>
-  </Receiver>
-  <Receiver>
-    <Name>Document ID Generator</Name>
-    <Synchronization>Synchronous</Synchronization>
-    <Type>10002</Type>
-    <SequenceNumber>1001</SequenceNumber>
-    <Assembly>Microsoft.Office.DocumentManagement, Version=14.0.0.0, Culture=neutral, PublicKeyToken=71e9bce111e9429c</Assembly>
-    <Class>Microsoft.Office.DocumentManagement.Internal.DocIdHandler</Class>
-    <Data/>
-    <Filter/>
-  </Receiver>
-  <Receiver>
-    <Name>Document ID Generator</Name>
-    <Synchronization>Synchronous</Synchronization>
-    <Type>10004</Type>
-    <SequenceNumber>1002</SequenceNumber>
-    <Assembly>Microsoft.Office.DocumentManagement, Version=14.0.0.0, Culture=neutral, PublicKeyToken=71e9bce111e9429c</Assembly>
-    <Class>Microsoft.Office.DocumentManagement.Internal.DocIdHandler</Class>
-    <Data/>
-    <Filter/>
-  </Receiver>
-  <Receiver>
-    <Name>Document ID Generator</Name>
-    <Synchronization>Synchronous</Synchronization>
-    <Type>10006</Type>
-    <SequenceNumber>1003</SequenceNumber>
-    <Assembly>Microsoft.Office.DocumentManagement, Version=14.0.0.0, Culture=neutral, PublicKeyToken=71e9bce111e9429c</Assembly>
-    <Class>Microsoft.Office.DocumentManagement.Internal.DocIdHandler</Class>
-    <Data/>
-    <Filter/>
-  </Receiver>
-  <Receiver>
-    <Name>Document ID Generator</Name>
-    <Synchronization>Synchronous</Synchronization>
-    <Type>10009</Type>
-    <SequenceNumber>1004</SequenceNumber>
-    <Assembly>Microsoft.Office.DocumentManagement, Version=14.0.0.0, Culture=neutral, PublicKeyToken=71e9bce111e9429c</Assembly>
-    <Class>Microsoft.Office.DocumentManagement.Internal.DocIdHandler</Class>
-    <Data/>
-    <Filter/>
-  </Receiver>
-</spe:Receivers>
+<file path=customXml/itemProps1.xml><?xml version="1.0" encoding="utf-8"?>
+<ds:datastoreItem xmlns:ds="http://schemas.openxmlformats.org/officeDocument/2006/customXml" ds:itemID="{E5FD8E07-4E68-4E3F-96BD-4FFA3AC81A1B}">
+  <ds:schemaRefs>
+    <ds:schemaRef ds:uri="http://schemas.microsoft.com/sharepoint/events"/>
+  </ds:schemaRefs>
+</ds:datastoreItem>
 </file>
 
-<file path=customXml/itemProps1.xml><?xml version="1.0" encoding="utf-8"?>
+<file path=customXml/itemProps2.xml><?xml version="1.0" encoding="utf-8"?>
 <ds:datastoreItem xmlns:ds="http://schemas.openxmlformats.org/officeDocument/2006/customXml" ds:itemID="{C12AFFCC-E1DC-4673-B786-3C88E30A3D8E}">
   <ds:schemaRefs>
     <ds:schemaRef ds:uri="Microsoft.SharePoint.Taxonomy.ContentTypeSync"/>
@@ -22450,7 +22492,7 @@
 </ds:datastoreItem>
 </file>
 
-<file path=customXml/itemProps2.xml><?xml version="1.0" encoding="utf-8"?>
+<file path=customXml/itemProps3.xml><?xml version="1.0" encoding="utf-8"?>
 <ds:datastoreItem xmlns:ds="http://schemas.openxmlformats.org/officeDocument/2006/customXml" ds:itemID="{C11CD21E-5B4D-41AA-8CC9-0207EAA9F12F}">
   <ds:schemaRefs>
     <ds:schemaRef ds:uri="http://schemas.microsoft.com/office/2006/metadata/contentType"/>
@@ -22472,7 +22514,7 @@
 </ds:datastoreItem>
 </file>
 
-<file path=customXml/itemProps3.xml><?xml version="1.0" encoding="utf-8"?>
+<file path=customXml/itemProps4.xml><?xml version="1.0" encoding="utf-8"?>
 <ds:datastoreItem xmlns:ds="http://schemas.openxmlformats.org/officeDocument/2006/customXml" ds:itemID="{14D87765-BD76-43B8-A7B8-9DBD5B7B4763}">
   <ds:schemaRefs>
     <ds:schemaRef ds:uri="230e9df3-be65-4c73-a93b-d1236ebd677e"/>
@@ -22492,18 +22534,10 @@
 </ds:datastoreItem>
 </file>
 
-<file path=customXml/itemProps4.xml><?xml version="1.0" encoding="utf-8"?>
+<file path=customXml/itemProps5.xml><?xml version="1.0" encoding="utf-8"?>
 <ds:datastoreItem xmlns:ds="http://schemas.openxmlformats.org/officeDocument/2006/customXml" ds:itemID="{637CE760-3C25-48EA-9D92-DCD8CAA51C39}">
   <ds:schemaRefs>
     <ds:schemaRef ds:uri="http://schemas.microsoft.com/sharepoint/v3/contenttype/forms"/>
   </ds:schemaRefs>
 </ds:datastoreItem>
-</file>
-
-<file path=customXml/itemProps5.xml><?xml version="1.0" encoding="utf-8"?>
-<ds:datastoreItem xmlns:ds="http://schemas.openxmlformats.org/officeDocument/2006/customXml" ds:itemID="{E5FD8E07-4E68-4E3F-96BD-4FFA3AC81A1B}">
-  <ds:schemaRefs>
-    <ds:schemaRef ds:uri="http://schemas.microsoft.com/sharepoint/events"/>
-  </ds:schemaRefs>
-</ds:datastoreItem>
 </file>
</xml_diff>